<commit_message>
Fix error in listings
</commit_message>
<xml_diff>
--- a/chalice2sil/doc/initial-project-presentation.pptx
+++ b/chalice2sil/doc/initial-project-presentation.pptx
@@ -8330,7 +8330,14 @@
                 <a:latin typeface="Consolas" pitchFamily="49" charset="0"/>
                 <a:cs typeface="Consolas" pitchFamily="49" charset="0"/>
               </a:rPr>
-              <a:t>        requires 0 &lt; d;</a:t>
+              <a:t>        requires 0 &lt; d</a:t>
+            </a:r>
+            <a:r>
+              <a:rPr lang="en-GB" sz="1800" spc="-150" dirty="0" smtClean="0">
+                <a:latin typeface="Consolas" pitchFamily="49" charset="0"/>
+                <a:cs typeface="Consolas" pitchFamily="49" charset="0"/>
+              </a:rPr>
+              <a:t>;</a:t>
             </a:r>
           </a:p>
           <a:p>
@@ -8346,7 +8353,69 @@
                 <a:latin typeface="Consolas" pitchFamily="49" charset="0"/>
                 <a:cs typeface="Consolas" pitchFamily="49" charset="0"/>
               </a:rPr>
-              <a:t>        ensures v == old(v) + d;</a:t>
+              <a:t> </a:t>
+            </a:r>
+            <a:r>
+              <a:rPr lang="en-GB" sz="1800" spc="-150" dirty="0" smtClean="0">
+                <a:latin typeface="Consolas" pitchFamily="49" charset="0"/>
+                <a:cs typeface="Consolas" pitchFamily="49" charset="0"/>
+              </a:rPr>
+              <a:t>       requires </a:t>
+            </a:r>
+            <a:r>
+              <a:rPr lang="en-GB" sz="1800" spc="-150" dirty="0" err="1" smtClean="0">
+                <a:latin typeface="Consolas" pitchFamily="49" charset="0"/>
+                <a:cs typeface="Consolas" pitchFamily="49" charset="0"/>
+              </a:rPr>
+              <a:t>acc</a:t>
+            </a:r>
+            <a:r>
+              <a:rPr lang="en-GB" sz="1800" spc="-150" dirty="0" smtClean="0">
+                <a:latin typeface="Consolas" pitchFamily="49" charset="0"/>
+                <a:cs typeface="Consolas" pitchFamily="49" charset="0"/>
+              </a:rPr>
+              <a:t>(v);</a:t>
+            </a:r>
+            <a:endParaRPr lang="en-GB" sz="1800" spc="-150" dirty="0" smtClean="0">
+              <a:latin typeface="Consolas" pitchFamily="49" charset="0"/>
+              <a:cs typeface="Consolas" pitchFamily="49" charset="0"/>
+            </a:endParaRPr>
+          </a:p>
+          <a:p>
+            <a:pPr marL="0" indent="0">
+              <a:buNone/>
+              <a:tabLst>
+                <a:tab pos="177800" algn="l"/>
+                <a:tab pos="355600" algn="l"/>
+              </a:tabLst>
+            </a:pPr>
+            <a:r>
+              <a:rPr lang="en-GB" sz="1800" spc="-150" dirty="0">
+                <a:latin typeface="Consolas" pitchFamily="49" charset="0"/>
+                <a:cs typeface="Consolas" pitchFamily="49" charset="0"/>
+              </a:rPr>
+              <a:t> </a:t>
+            </a:r>
+            <a:r>
+              <a:rPr lang="en-GB" sz="1800" spc="-150" dirty="0" smtClean="0">
+                <a:latin typeface="Consolas" pitchFamily="49" charset="0"/>
+                <a:cs typeface="Consolas" pitchFamily="49" charset="0"/>
+              </a:rPr>
+              <a:t>       </a:t>
+            </a:r>
+            <a:r>
+              <a:rPr lang="en-GB" sz="1800" spc="-150" dirty="0" smtClean="0">
+                <a:latin typeface="Consolas" pitchFamily="49" charset="0"/>
+                <a:cs typeface="Consolas" pitchFamily="49" charset="0"/>
+              </a:rPr>
+              <a:t>ensures </a:t>
+            </a:r>
+            <a:r>
+              <a:rPr lang="en-GB" sz="1800" spc="-150" dirty="0">
+                <a:latin typeface="Consolas" pitchFamily="49" charset="0"/>
+                <a:cs typeface="Consolas" pitchFamily="49" charset="0"/>
+              </a:rPr>
+              <a:t>v == old(v) + d;</a:t>
             </a:r>
           </a:p>
           <a:p>

</xml_diff>

<commit_message>
Fix type in presentation, description
</commit_message>
<xml_diff>
--- a/chalice2sil/doc/initial-project-presentation.pptx
+++ b/chalice2sil/doc/initial-project-presentation.pptx
@@ -201,7 +201,7 @@
           <a:p>
             <a:fld id="{6DB6AAD4-3FBA-4F1B-B7C1-5B70ABEEACFC}" type="datetimeFigureOut">
               <a:rPr lang="en-GB" smtClean="0"/>
-              <a:t>17/11/2011</a:t>
+              <a:t>23/11/2011</a:t>
             </a:fld>
             <a:endParaRPr lang="en-GB"/>
           </a:p>
@@ -650,7 +650,7 @@
           <a:p>
             <a:fld id="{21AFF90E-51F9-4729-BBD1-11D1E0841110}" type="datetimeFigureOut">
               <a:rPr lang="de-CH" smtClean="0"/>
-              <a:t>17.11.2011</a:t>
+              <a:t>23.11.2011</a:t>
             </a:fld>
             <a:endParaRPr lang="de-CH"/>
           </a:p>
@@ -827,7 +827,7 @@
           <a:p>
             <a:fld id="{21AFF90E-51F9-4729-BBD1-11D1E0841110}" type="datetimeFigureOut">
               <a:rPr lang="de-CH" smtClean="0"/>
-              <a:t>17.11.2011</a:t>
+              <a:t>23.11.2011</a:t>
             </a:fld>
             <a:endParaRPr lang="de-CH"/>
           </a:p>
@@ -1007,7 +1007,7 @@
           <a:p>
             <a:fld id="{21AFF90E-51F9-4729-BBD1-11D1E0841110}" type="datetimeFigureOut">
               <a:rPr lang="de-CH" smtClean="0"/>
-              <a:t>17.11.2011</a:t>
+              <a:t>23.11.2011</a:t>
             </a:fld>
             <a:endParaRPr lang="de-CH"/>
           </a:p>
@@ -1249,7 +1249,7 @@
           <a:p>
             <a:fld id="{86642A0F-B730-4E28-B731-7E298DDE1A66}" type="datetimeFigureOut">
               <a:rPr lang="en-GB" smtClean="0"/>
-              <a:t>17/11/2011</a:t>
+              <a:t>23/11/2011</a:t>
             </a:fld>
             <a:endParaRPr lang="en-GB"/>
           </a:p>
@@ -1426,7 +1426,7 @@
           <a:p>
             <a:fld id="{86642A0F-B730-4E28-B731-7E298DDE1A66}" type="datetimeFigureOut">
               <a:rPr lang="en-GB" smtClean="0"/>
-              <a:t>17/11/2011</a:t>
+              <a:t>23/11/2011</a:t>
             </a:fld>
             <a:endParaRPr lang="en-GB"/>
           </a:p>
@@ -1672,7 +1672,7 @@
           <a:p>
             <a:fld id="{86642A0F-B730-4E28-B731-7E298DDE1A66}" type="datetimeFigureOut">
               <a:rPr lang="en-GB" smtClean="0"/>
-              <a:t>17/11/2011</a:t>
+              <a:t>23/11/2011</a:t>
             </a:fld>
             <a:endParaRPr lang="en-GB"/>
           </a:p>
@@ -1960,7 +1960,7 @@
           <a:p>
             <a:fld id="{86642A0F-B730-4E28-B731-7E298DDE1A66}" type="datetimeFigureOut">
               <a:rPr lang="en-GB" smtClean="0"/>
-              <a:t>17/11/2011</a:t>
+              <a:t>23/11/2011</a:t>
             </a:fld>
             <a:endParaRPr lang="en-GB"/>
           </a:p>
@@ -2382,7 +2382,7 @@
           <a:p>
             <a:fld id="{86642A0F-B730-4E28-B731-7E298DDE1A66}" type="datetimeFigureOut">
               <a:rPr lang="en-GB" smtClean="0"/>
-              <a:t>17/11/2011</a:t>
+              <a:t>23/11/2011</a:t>
             </a:fld>
             <a:endParaRPr lang="en-GB"/>
           </a:p>
@@ -2500,7 +2500,7 @@
           <a:p>
             <a:fld id="{86642A0F-B730-4E28-B731-7E298DDE1A66}" type="datetimeFigureOut">
               <a:rPr lang="en-GB" smtClean="0"/>
-              <a:t>17/11/2011</a:t>
+              <a:t>23/11/2011</a:t>
             </a:fld>
             <a:endParaRPr lang="en-GB"/>
           </a:p>
@@ -2595,7 +2595,7 @@
           <a:p>
             <a:fld id="{86642A0F-B730-4E28-B731-7E298DDE1A66}" type="datetimeFigureOut">
               <a:rPr lang="en-GB" smtClean="0"/>
-              <a:t>17/11/2011</a:t>
+              <a:t>23/11/2011</a:t>
             </a:fld>
             <a:endParaRPr lang="en-GB"/>
           </a:p>
@@ -2872,7 +2872,7 @@
           <a:p>
             <a:fld id="{86642A0F-B730-4E28-B731-7E298DDE1A66}" type="datetimeFigureOut">
               <a:rPr lang="en-GB" smtClean="0"/>
-              <a:t>17/11/2011</a:t>
+              <a:t>23/11/2011</a:t>
             </a:fld>
             <a:endParaRPr lang="en-GB"/>
           </a:p>
@@ -3042,7 +3042,7 @@
           <a:p>
             <a:fld id="{21AFF90E-51F9-4729-BBD1-11D1E0841110}" type="datetimeFigureOut">
               <a:rPr lang="de-CH" smtClean="0"/>
-              <a:t>17.11.2011</a:t>
+              <a:t>23.11.2011</a:t>
             </a:fld>
             <a:endParaRPr lang="de-CH"/>
           </a:p>
@@ -3302,7 +3302,7 @@
           <a:p>
             <a:fld id="{86642A0F-B730-4E28-B731-7E298DDE1A66}" type="datetimeFigureOut">
               <a:rPr lang="en-GB" smtClean="0"/>
-              <a:t>17/11/2011</a:t>
+              <a:t>23/11/2011</a:t>
             </a:fld>
             <a:endParaRPr lang="en-GB"/>
           </a:p>
@@ -3472,7 +3472,7 @@
           <a:p>
             <a:fld id="{86642A0F-B730-4E28-B731-7E298DDE1A66}" type="datetimeFigureOut">
               <a:rPr lang="en-GB" smtClean="0"/>
-              <a:t>17/11/2011</a:t>
+              <a:t>23/11/2011</a:t>
             </a:fld>
             <a:endParaRPr lang="en-GB"/>
           </a:p>
@@ -3652,7 +3652,7 @@
           <a:p>
             <a:fld id="{86642A0F-B730-4E28-B731-7E298DDE1A66}" type="datetimeFigureOut">
               <a:rPr lang="en-GB" smtClean="0"/>
-              <a:t>17/11/2011</a:t>
+              <a:t>23/11/2011</a:t>
             </a:fld>
             <a:endParaRPr lang="en-GB"/>
           </a:p>
@@ -3898,7 +3898,7 @@
           <a:p>
             <a:fld id="{21AFF90E-51F9-4729-BBD1-11D1E0841110}" type="datetimeFigureOut">
               <a:rPr lang="de-CH" smtClean="0"/>
-              <a:t>17.11.2011</a:t>
+              <a:t>23.11.2011</a:t>
             </a:fld>
             <a:endParaRPr lang="de-CH"/>
           </a:p>
@@ -4186,7 +4186,7 @@
           <a:p>
             <a:fld id="{21AFF90E-51F9-4729-BBD1-11D1E0841110}" type="datetimeFigureOut">
               <a:rPr lang="de-CH" smtClean="0"/>
-              <a:t>17.11.2011</a:t>
+              <a:t>23.11.2011</a:t>
             </a:fld>
             <a:endParaRPr lang="de-CH"/>
           </a:p>
@@ -4608,7 +4608,7 @@
           <a:p>
             <a:fld id="{21AFF90E-51F9-4729-BBD1-11D1E0841110}" type="datetimeFigureOut">
               <a:rPr lang="de-CH" smtClean="0"/>
-              <a:t>17.11.2011</a:t>
+              <a:t>23.11.2011</a:t>
             </a:fld>
             <a:endParaRPr lang="de-CH"/>
           </a:p>
@@ -4726,7 +4726,7 @@
           <a:p>
             <a:fld id="{21AFF90E-51F9-4729-BBD1-11D1E0841110}" type="datetimeFigureOut">
               <a:rPr lang="de-CH" smtClean="0"/>
-              <a:t>17.11.2011</a:t>
+              <a:t>23.11.2011</a:t>
             </a:fld>
             <a:endParaRPr lang="de-CH"/>
           </a:p>
@@ -4821,7 +4821,7 @@
           <a:p>
             <a:fld id="{21AFF90E-51F9-4729-BBD1-11D1E0841110}" type="datetimeFigureOut">
               <a:rPr lang="de-CH" smtClean="0"/>
-              <a:t>17.11.2011</a:t>
+              <a:t>23.11.2011</a:t>
             </a:fld>
             <a:endParaRPr lang="de-CH"/>
           </a:p>
@@ -5098,7 +5098,7 @@
           <a:p>
             <a:fld id="{21AFF90E-51F9-4729-BBD1-11D1E0841110}" type="datetimeFigureOut">
               <a:rPr lang="de-CH" smtClean="0"/>
-              <a:t>17.11.2011</a:t>
+              <a:t>23.11.2011</a:t>
             </a:fld>
             <a:endParaRPr lang="de-CH"/>
           </a:p>
@@ -5351,7 +5351,7 @@
           <a:p>
             <a:fld id="{21AFF90E-51F9-4729-BBD1-11D1E0841110}" type="datetimeFigureOut">
               <a:rPr lang="de-CH" smtClean="0"/>
-              <a:t>17.11.2011</a:t>
+              <a:t>23.11.2011</a:t>
             </a:fld>
             <a:endParaRPr lang="de-CH"/>
           </a:p>
@@ -5720,7 +5720,7 @@
           <a:p>
             <a:fld id="{21AFF90E-51F9-4729-BBD1-11D1E0841110}" type="datetimeFigureOut">
               <a:rPr lang="de-CH" smtClean="0"/>
-              <a:t>17.11.2011</a:t>
+              <a:t>23.11.2011</a:t>
             </a:fld>
             <a:endParaRPr lang="de-CH"/>
           </a:p>
@@ -6424,7 +6424,7 @@
           <a:p>
             <a:fld id="{86642A0F-B730-4E28-B731-7E298DDE1A66}" type="datetimeFigureOut">
               <a:rPr lang="en-GB" smtClean="0"/>
-              <a:t>17/11/2011</a:t>
+              <a:t>23/11/2011</a:t>
             </a:fld>
             <a:endParaRPr lang="en-GB"/>
           </a:p>
@@ -8531,7 +8531,6 @@
               <a:rPr lang="de-CH" dirty="0" smtClean="0"/>
               <a:t>Monitors</a:t>
             </a:r>
-            <a:endParaRPr lang="de-CH" dirty="0" smtClean="0"/>
           </a:p>
         </p:txBody>
       </p:sp>
@@ -8606,14 +8605,7 @@
                 <a:latin typeface="Consolas" pitchFamily="49" charset="0"/>
                 <a:cs typeface="Consolas" pitchFamily="49" charset="0"/>
               </a:rPr>
-              <a:t> </a:t>
-            </a:r>
-            <a:r>
-              <a:rPr lang="en-GB" sz="1800" spc="-150" dirty="0" smtClean="0">
-                <a:latin typeface="Consolas" pitchFamily="49" charset="0"/>
-                <a:cs typeface="Consolas" pitchFamily="49" charset="0"/>
-              </a:rPr>
-              <a:t>v: </a:t>
+              <a:t> v: </a:t>
             </a:r>
             <a:r>
               <a:rPr lang="en-GB" sz="1800" spc="-150" dirty="0" err="1" smtClean="0">
@@ -10142,8 +10134,17 @@
           <a:p>
             <a:r>
               <a:rPr lang="en-GB" dirty="0" smtClean="0"/>
-              <a:t>First front-end for Chalice</a:t>
-            </a:r>
+              <a:t>First front-end </a:t>
+            </a:r>
+            <a:r>
+              <a:rPr lang="en-GB" smtClean="0"/>
+              <a:t>for </a:t>
+            </a:r>
+            <a:r>
+              <a:rPr lang="en-GB" smtClean="0"/>
+              <a:t>SIL</a:t>
+            </a:r>
+            <a:endParaRPr lang="en-GB" dirty="0" smtClean="0"/>
           </a:p>
           <a:p>
             <a:r>

</xml_diff>